<commit_message>
uploading GIF of shape transformation
</commit_message>
<xml_diff>
--- a/figures/MMBS Figures.pptx
+++ b/figures/MMBS Figures.pptx
@@ -327,7 +327,7 @@
           <a:p>
             <a:fld id="{B4B82680-7EFC-594A-AE6D-8C42E1797072}" type="datetimeFigureOut">
               <a:rPr lang="en-US" smtClean="0"/>
-              <a:t>11/14/20</a:t>
+              <a:t>11/19/20</a:t>
             </a:fld>
             <a:endParaRPr lang="en-US"/>
           </a:p>
@@ -1678,7 +1678,7 @@
           <a:p>
             <a:fld id="{9EEB5D18-614A-1A43-9057-E06F7A7EDE83}" type="datetimeFigureOut">
               <a:rPr lang="en-US" smtClean="0"/>
-              <a:t>11/14/20</a:t>
+              <a:t>11/19/20</a:t>
             </a:fld>
             <a:endParaRPr lang="en-US"/>
           </a:p>
@@ -1876,7 +1876,7 @@
           <a:p>
             <a:fld id="{9EEB5D18-614A-1A43-9057-E06F7A7EDE83}" type="datetimeFigureOut">
               <a:rPr lang="en-US" smtClean="0"/>
-              <a:t>11/14/20</a:t>
+              <a:t>11/19/20</a:t>
             </a:fld>
             <a:endParaRPr lang="en-US"/>
           </a:p>
@@ -2084,7 +2084,7 @@
           <a:p>
             <a:fld id="{9EEB5D18-614A-1A43-9057-E06F7A7EDE83}" type="datetimeFigureOut">
               <a:rPr lang="en-US" smtClean="0"/>
-              <a:t>11/14/20</a:t>
+              <a:t>11/19/20</a:t>
             </a:fld>
             <a:endParaRPr lang="en-US"/>
           </a:p>
@@ -2282,7 +2282,7 @@
           <a:p>
             <a:fld id="{9EEB5D18-614A-1A43-9057-E06F7A7EDE83}" type="datetimeFigureOut">
               <a:rPr lang="en-US" smtClean="0"/>
-              <a:t>11/14/20</a:t>
+              <a:t>11/19/20</a:t>
             </a:fld>
             <a:endParaRPr lang="en-US"/>
           </a:p>
@@ -2557,7 +2557,7 @@
           <a:p>
             <a:fld id="{9EEB5D18-614A-1A43-9057-E06F7A7EDE83}" type="datetimeFigureOut">
               <a:rPr lang="en-US" smtClean="0"/>
-              <a:t>11/14/20</a:t>
+              <a:t>11/19/20</a:t>
             </a:fld>
             <a:endParaRPr lang="en-US"/>
           </a:p>
@@ -2822,7 +2822,7 @@
           <a:p>
             <a:fld id="{9EEB5D18-614A-1A43-9057-E06F7A7EDE83}" type="datetimeFigureOut">
               <a:rPr lang="en-US" smtClean="0"/>
-              <a:t>11/14/20</a:t>
+              <a:t>11/19/20</a:t>
             </a:fld>
             <a:endParaRPr lang="en-US"/>
           </a:p>
@@ -3234,7 +3234,7 @@
           <a:p>
             <a:fld id="{9EEB5D18-614A-1A43-9057-E06F7A7EDE83}" type="datetimeFigureOut">
               <a:rPr lang="en-US" smtClean="0"/>
-              <a:t>11/14/20</a:t>
+              <a:t>11/19/20</a:t>
             </a:fld>
             <a:endParaRPr lang="en-US"/>
           </a:p>
@@ -3375,7 +3375,7 @@
           <a:p>
             <a:fld id="{9EEB5D18-614A-1A43-9057-E06F7A7EDE83}" type="datetimeFigureOut">
               <a:rPr lang="en-US" smtClean="0"/>
-              <a:t>11/14/20</a:t>
+              <a:t>11/19/20</a:t>
             </a:fld>
             <a:endParaRPr lang="en-US"/>
           </a:p>
@@ -3488,7 +3488,7 @@
           <a:p>
             <a:fld id="{9EEB5D18-614A-1A43-9057-E06F7A7EDE83}" type="datetimeFigureOut">
               <a:rPr lang="en-US" smtClean="0"/>
-              <a:t>11/14/20</a:t>
+              <a:t>11/19/20</a:t>
             </a:fld>
             <a:endParaRPr lang="en-US"/>
           </a:p>
@@ -3799,7 +3799,7 @@
           <a:p>
             <a:fld id="{9EEB5D18-614A-1A43-9057-E06F7A7EDE83}" type="datetimeFigureOut">
               <a:rPr lang="en-US" smtClean="0"/>
-              <a:t>11/14/20</a:t>
+              <a:t>11/19/20</a:t>
             </a:fld>
             <a:endParaRPr lang="en-US"/>
           </a:p>
@@ -4087,7 +4087,7 @@
           <a:p>
             <a:fld id="{9EEB5D18-614A-1A43-9057-E06F7A7EDE83}" type="datetimeFigureOut">
               <a:rPr lang="en-US" smtClean="0"/>
-              <a:t>11/14/20</a:t>
+              <a:t>11/19/20</a:t>
             </a:fld>
             <a:endParaRPr lang="en-US"/>
           </a:p>
@@ -4328,7 +4328,7 @@
           <a:p>
             <a:fld id="{9EEB5D18-614A-1A43-9057-E06F7A7EDE83}" type="datetimeFigureOut">
               <a:rPr lang="en-US" smtClean="0"/>
-              <a:t>11/14/20</a:t>
+              <a:t>11/19/20</a:t>
             </a:fld>
             <a:endParaRPr lang="en-US"/>
           </a:p>

</xml_diff>